<commit_message>
updated content for vs code and venvs
</commit_message>
<xml_diff>
--- a/Misc Topics/Executables and Paths.pptx
+++ b/Misc Topics/Executables and Paths.pptx
@@ -4,6 +4,9 @@
   <p:sldMasterIdLst>
     <p:sldMasterId id="2147483648" r:id="rId1"/>
   </p:sldMasterIdLst>
+  <p:notesMasterIdLst>
+    <p:notesMasterId r:id="rId17"/>
+  </p:notesMasterIdLst>
   <p:sldIdLst>
     <p:sldId id="256" r:id="rId2"/>
     <p:sldId id="257" r:id="rId3"/>
@@ -13,12 +16,13 @@
     <p:sldId id="261" r:id="rId7"/>
     <p:sldId id="262" r:id="rId8"/>
     <p:sldId id="264" r:id="rId9"/>
-    <p:sldId id="268" r:id="rId10"/>
-    <p:sldId id="269" r:id="rId11"/>
-    <p:sldId id="263" r:id="rId12"/>
-    <p:sldId id="265" r:id="rId13"/>
-    <p:sldId id="266" r:id="rId14"/>
-    <p:sldId id="267" r:id="rId15"/>
+    <p:sldId id="270" r:id="rId10"/>
+    <p:sldId id="268" r:id="rId11"/>
+    <p:sldId id="269" r:id="rId12"/>
+    <p:sldId id="263" r:id="rId13"/>
+    <p:sldId id="265" r:id="rId14"/>
+    <p:sldId id="266" r:id="rId15"/>
+    <p:sldId id="267" r:id="rId16"/>
   </p:sldIdLst>
   <p:sldSz cx="12192000" cy="6858000"/>
   <p:notesSz cx="6858000" cy="9144000"/>
@@ -117,7 +121,767 @@
       </a:defRPr>
     </a:lvl9pPr>
   </p:defaultTextStyle>
+  <p:extLst>
+    <p:ext uri="{EFAFB233-063F-42B5-8137-9DF3F51BA10A}">
+      <p15:sldGuideLst xmlns:p15="http://schemas.microsoft.com/office/powerpoint/2012/main"/>
+    </p:ext>
+  </p:extLst>
 </p:presentation>
+</file>
+
+<file path=ppt/notesMasters/notesMaster1.xml><?xml version="1.0" encoding="utf-8"?>
+<p:notesMaster xmlns:a="http://schemas.openxmlformats.org/drawingml/2006/main" xmlns:r="http://schemas.openxmlformats.org/officeDocument/2006/relationships" xmlns:p="http://schemas.openxmlformats.org/presentationml/2006/main">
+  <p:cSld>
+    <p:bg>
+      <p:bgRef idx="1001">
+        <a:schemeClr val="bg1"/>
+      </p:bgRef>
+    </p:bg>
+    <p:spTree>
+      <p:nvGrpSpPr>
+        <p:cNvPr id="1" name=""/>
+        <p:cNvGrpSpPr/>
+        <p:nvPr/>
+      </p:nvGrpSpPr>
+      <p:grpSpPr>
+        <a:xfrm>
+          <a:off x="0" y="0"/>
+          <a:ext cx="0" cy="0"/>
+          <a:chOff x="0" y="0"/>
+          <a:chExt cx="0" cy="0"/>
+        </a:xfrm>
+      </p:grpSpPr>
+      <p:sp>
+        <p:nvSpPr>
+          <p:cNvPr id="2" name="Header Placeholder 1"/>
+          <p:cNvSpPr>
+            <a:spLocks noGrp="1"/>
+          </p:cNvSpPr>
+          <p:nvPr>
+            <p:ph type="hdr" sz="quarter"/>
+          </p:nvPr>
+        </p:nvSpPr>
+        <p:spPr>
+          <a:xfrm>
+            <a:off x="0" y="0"/>
+            <a:ext cx="2971800" cy="458788"/>
+          </a:xfrm>
+          <a:prstGeom prst="rect">
+            <a:avLst/>
+          </a:prstGeom>
+        </p:spPr>
+        <p:txBody>
+          <a:bodyPr vert="horz" lIns="91440" tIns="45720" rIns="91440" bIns="45720" rtlCol="0"/>
+          <a:lstStyle>
+            <a:lvl1pPr algn="l">
+              <a:defRPr sz="1200"/>
+            </a:lvl1pPr>
+          </a:lstStyle>
+          <a:p>
+            <a:endParaRPr lang="en-US"/>
+          </a:p>
+        </p:txBody>
+      </p:sp>
+      <p:sp>
+        <p:nvSpPr>
+          <p:cNvPr id="3" name="Date Placeholder 2"/>
+          <p:cNvSpPr>
+            <a:spLocks noGrp="1"/>
+          </p:cNvSpPr>
+          <p:nvPr>
+            <p:ph type="dt" idx="1"/>
+          </p:nvPr>
+        </p:nvSpPr>
+        <p:spPr>
+          <a:xfrm>
+            <a:off x="3884613" y="0"/>
+            <a:ext cx="2971800" cy="458788"/>
+          </a:xfrm>
+          <a:prstGeom prst="rect">
+            <a:avLst/>
+          </a:prstGeom>
+        </p:spPr>
+        <p:txBody>
+          <a:bodyPr vert="horz" lIns="91440" tIns="45720" rIns="91440" bIns="45720" rtlCol="0"/>
+          <a:lstStyle>
+            <a:lvl1pPr algn="r">
+              <a:defRPr sz="1200"/>
+            </a:lvl1pPr>
+          </a:lstStyle>
+          <a:p>
+            <a:fld id="{7D2F5B96-EC90-4B10-91AC-E32DA21E81E1}" type="datetimeFigureOut">
+              <a:rPr lang="en-US" smtClean="0"/>
+              <a:t>9/17/2025</a:t>
+            </a:fld>
+            <a:endParaRPr lang="en-US"/>
+          </a:p>
+        </p:txBody>
+      </p:sp>
+      <p:sp>
+        <p:nvSpPr>
+          <p:cNvPr id="4" name="Slide Image Placeholder 3"/>
+          <p:cNvSpPr>
+            <a:spLocks noGrp="1" noRot="1" noChangeAspect="1"/>
+          </p:cNvSpPr>
+          <p:nvPr>
+            <p:ph type="sldImg" idx="2"/>
+          </p:nvPr>
+        </p:nvSpPr>
+        <p:spPr>
+          <a:xfrm>
+            <a:off x="685800" y="1143000"/>
+            <a:ext cx="5486400" cy="3086100"/>
+          </a:xfrm>
+          <a:prstGeom prst="rect">
+            <a:avLst/>
+          </a:prstGeom>
+          <a:noFill/>
+          <a:ln w="12700">
+            <a:solidFill>
+              <a:prstClr val="black"/>
+            </a:solidFill>
+          </a:ln>
+        </p:spPr>
+        <p:txBody>
+          <a:bodyPr vert="horz" lIns="91440" tIns="45720" rIns="91440" bIns="45720" rtlCol="0" anchor="ctr"/>
+          <a:lstStyle/>
+          <a:p>
+            <a:endParaRPr lang="en-US"/>
+          </a:p>
+        </p:txBody>
+      </p:sp>
+      <p:sp>
+        <p:nvSpPr>
+          <p:cNvPr id="5" name="Notes Placeholder 4"/>
+          <p:cNvSpPr>
+            <a:spLocks noGrp="1"/>
+          </p:cNvSpPr>
+          <p:nvPr>
+            <p:ph type="body" sz="quarter" idx="3"/>
+          </p:nvPr>
+        </p:nvSpPr>
+        <p:spPr>
+          <a:xfrm>
+            <a:off x="685800" y="4400550"/>
+            <a:ext cx="5486400" cy="3600450"/>
+          </a:xfrm>
+          <a:prstGeom prst="rect">
+            <a:avLst/>
+          </a:prstGeom>
+        </p:spPr>
+        <p:txBody>
+          <a:bodyPr vert="horz" lIns="91440" tIns="45720" rIns="91440" bIns="45720" rtlCol="0"/>
+          <a:lstStyle/>
+          <a:p>
+            <a:pPr lvl="0"/>
+            <a:r>
+              <a:rPr lang="en-US"/>
+              <a:t>Click to edit Master text styles</a:t>
+            </a:r>
+          </a:p>
+          <a:p>
+            <a:pPr lvl="1"/>
+            <a:r>
+              <a:rPr lang="en-US"/>
+              <a:t>Second level</a:t>
+            </a:r>
+          </a:p>
+          <a:p>
+            <a:pPr lvl="2"/>
+            <a:r>
+              <a:rPr lang="en-US"/>
+              <a:t>Third level</a:t>
+            </a:r>
+          </a:p>
+          <a:p>
+            <a:pPr lvl="3"/>
+            <a:r>
+              <a:rPr lang="en-US"/>
+              <a:t>Fourth level</a:t>
+            </a:r>
+          </a:p>
+          <a:p>
+            <a:pPr lvl="4"/>
+            <a:r>
+              <a:rPr lang="en-US"/>
+              <a:t>Fifth level</a:t>
+            </a:r>
+          </a:p>
+        </p:txBody>
+      </p:sp>
+      <p:sp>
+        <p:nvSpPr>
+          <p:cNvPr id="6" name="Footer Placeholder 5"/>
+          <p:cNvSpPr>
+            <a:spLocks noGrp="1"/>
+          </p:cNvSpPr>
+          <p:nvPr>
+            <p:ph type="ftr" sz="quarter" idx="4"/>
+          </p:nvPr>
+        </p:nvSpPr>
+        <p:spPr>
+          <a:xfrm>
+            <a:off x="0" y="8685213"/>
+            <a:ext cx="2971800" cy="458787"/>
+          </a:xfrm>
+          <a:prstGeom prst="rect">
+            <a:avLst/>
+          </a:prstGeom>
+        </p:spPr>
+        <p:txBody>
+          <a:bodyPr vert="horz" lIns="91440" tIns="45720" rIns="91440" bIns="45720" rtlCol="0" anchor="b"/>
+          <a:lstStyle>
+            <a:lvl1pPr algn="l">
+              <a:defRPr sz="1200"/>
+            </a:lvl1pPr>
+          </a:lstStyle>
+          <a:p>
+            <a:endParaRPr lang="en-US"/>
+          </a:p>
+        </p:txBody>
+      </p:sp>
+      <p:sp>
+        <p:nvSpPr>
+          <p:cNvPr id="7" name="Slide Number Placeholder 6"/>
+          <p:cNvSpPr>
+            <a:spLocks noGrp="1"/>
+          </p:cNvSpPr>
+          <p:nvPr>
+            <p:ph type="sldNum" sz="quarter" idx="5"/>
+          </p:nvPr>
+        </p:nvSpPr>
+        <p:spPr>
+          <a:xfrm>
+            <a:off x="3884613" y="8685213"/>
+            <a:ext cx="2971800" cy="458787"/>
+          </a:xfrm>
+          <a:prstGeom prst="rect">
+            <a:avLst/>
+          </a:prstGeom>
+        </p:spPr>
+        <p:txBody>
+          <a:bodyPr vert="horz" lIns="91440" tIns="45720" rIns="91440" bIns="45720" rtlCol="0" anchor="b"/>
+          <a:lstStyle>
+            <a:lvl1pPr algn="r">
+              <a:defRPr sz="1200"/>
+            </a:lvl1pPr>
+          </a:lstStyle>
+          <a:p>
+            <a:fld id="{BE457D5F-ED05-449E-97D0-205DAB987247}" type="slidenum">
+              <a:rPr lang="en-US" smtClean="0"/>
+              <a:t>‹#›</a:t>
+            </a:fld>
+            <a:endParaRPr lang="en-US"/>
+          </a:p>
+        </p:txBody>
+      </p:sp>
+    </p:spTree>
+    <p:extLst>
+      <p:ext uri="{BB962C8B-B14F-4D97-AF65-F5344CB8AC3E}">
+        <p14:creationId xmlns:p14="http://schemas.microsoft.com/office/powerpoint/2010/main" val="606514309"/>
+      </p:ext>
+    </p:extLst>
+  </p:cSld>
+  <p:clrMap bg1="lt1" tx1="dk1" bg2="lt2" tx2="dk2" accent1="accent1" accent2="accent2" accent3="accent3" accent4="accent4" accent5="accent5" accent6="accent6" hlink="hlink" folHlink="folHlink"/>
+  <p:notesStyle>
+    <a:lvl1pPr marL="0" algn="l" defTabSz="914400" rtl="0" eaLnBrk="1" latinLnBrk="0" hangingPunct="1">
+      <a:defRPr sz="1200" kern="1200">
+        <a:solidFill>
+          <a:schemeClr val="tx1"/>
+        </a:solidFill>
+        <a:latin typeface="+mn-lt"/>
+        <a:ea typeface="+mn-ea"/>
+        <a:cs typeface="+mn-cs"/>
+      </a:defRPr>
+    </a:lvl1pPr>
+    <a:lvl2pPr marL="457200" algn="l" defTabSz="914400" rtl="0" eaLnBrk="1" latinLnBrk="0" hangingPunct="1">
+      <a:defRPr sz="1200" kern="1200">
+        <a:solidFill>
+          <a:schemeClr val="tx1"/>
+        </a:solidFill>
+        <a:latin typeface="+mn-lt"/>
+        <a:ea typeface="+mn-ea"/>
+        <a:cs typeface="+mn-cs"/>
+      </a:defRPr>
+    </a:lvl2pPr>
+    <a:lvl3pPr marL="914400" algn="l" defTabSz="914400" rtl="0" eaLnBrk="1" latinLnBrk="0" hangingPunct="1">
+      <a:defRPr sz="1200" kern="1200">
+        <a:solidFill>
+          <a:schemeClr val="tx1"/>
+        </a:solidFill>
+        <a:latin typeface="+mn-lt"/>
+        <a:ea typeface="+mn-ea"/>
+        <a:cs typeface="+mn-cs"/>
+      </a:defRPr>
+    </a:lvl3pPr>
+    <a:lvl4pPr marL="1371600" algn="l" defTabSz="914400" rtl="0" eaLnBrk="1" latinLnBrk="0" hangingPunct="1">
+      <a:defRPr sz="1200" kern="1200">
+        <a:solidFill>
+          <a:schemeClr val="tx1"/>
+        </a:solidFill>
+        <a:latin typeface="+mn-lt"/>
+        <a:ea typeface="+mn-ea"/>
+        <a:cs typeface="+mn-cs"/>
+      </a:defRPr>
+    </a:lvl4pPr>
+    <a:lvl5pPr marL="1828800" algn="l" defTabSz="914400" rtl="0" eaLnBrk="1" latinLnBrk="0" hangingPunct="1">
+      <a:defRPr sz="1200" kern="1200">
+        <a:solidFill>
+          <a:schemeClr val="tx1"/>
+        </a:solidFill>
+        <a:latin typeface="+mn-lt"/>
+        <a:ea typeface="+mn-ea"/>
+        <a:cs typeface="+mn-cs"/>
+      </a:defRPr>
+    </a:lvl5pPr>
+    <a:lvl6pPr marL="2286000" algn="l" defTabSz="914400" rtl="0" eaLnBrk="1" latinLnBrk="0" hangingPunct="1">
+      <a:defRPr sz="1200" kern="1200">
+        <a:solidFill>
+          <a:schemeClr val="tx1"/>
+        </a:solidFill>
+        <a:latin typeface="+mn-lt"/>
+        <a:ea typeface="+mn-ea"/>
+        <a:cs typeface="+mn-cs"/>
+      </a:defRPr>
+    </a:lvl6pPr>
+    <a:lvl7pPr marL="2743200" algn="l" defTabSz="914400" rtl="0" eaLnBrk="1" latinLnBrk="0" hangingPunct="1">
+      <a:defRPr sz="1200" kern="1200">
+        <a:solidFill>
+          <a:schemeClr val="tx1"/>
+        </a:solidFill>
+        <a:latin typeface="+mn-lt"/>
+        <a:ea typeface="+mn-ea"/>
+        <a:cs typeface="+mn-cs"/>
+      </a:defRPr>
+    </a:lvl7pPr>
+    <a:lvl8pPr marL="3200400" algn="l" defTabSz="914400" rtl="0" eaLnBrk="1" latinLnBrk="0" hangingPunct="1">
+      <a:defRPr sz="1200" kern="1200">
+        <a:solidFill>
+          <a:schemeClr val="tx1"/>
+        </a:solidFill>
+        <a:latin typeface="+mn-lt"/>
+        <a:ea typeface="+mn-ea"/>
+        <a:cs typeface="+mn-cs"/>
+      </a:defRPr>
+    </a:lvl8pPr>
+    <a:lvl9pPr marL="3657600" algn="l" defTabSz="914400" rtl="0" eaLnBrk="1" latinLnBrk="0" hangingPunct="1">
+      <a:defRPr sz="1200" kern="1200">
+        <a:solidFill>
+          <a:schemeClr val="tx1"/>
+        </a:solidFill>
+        <a:latin typeface="+mn-lt"/>
+        <a:ea typeface="+mn-ea"/>
+        <a:cs typeface="+mn-cs"/>
+      </a:defRPr>
+    </a:lvl9pPr>
+  </p:notesStyle>
+</p:notesMaster>
+</file>
+
+<file path=ppt/notesSlides/notesSlide1.xml><?xml version="1.0" encoding="utf-8"?>
+<p:notes xmlns:a="http://schemas.openxmlformats.org/drawingml/2006/main" xmlns:r="http://schemas.openxmlformats.org/officeDocument/2006/relationships" xmlns:p="http://schemas.openxmlformats.org/presentationml/2006/main">
+  <p:cSld>
+    <p:spTree>
+      <p:nvGrpSpPr>
+        <p:cNvPr id="1" name=""/>
+        <p:cNvGrpSpPr/>
+        <p:nvPr/>
+      </p:nvGrpSpPr>
+      <p:grpSpPr>
+        <a:xfrm>
+          <a:off x="0" y="0"/>
+          <a:ext cx="0" cy="0"/>
+          <a:chOff x="0" y="0"/>
+          <a:chExt cx="0" cy="0"/>
+        </a:xfrm>
+      </p:grpSpPr>
+      <p:sp>
+        <p:nvSpPr>
+          <p:cNvPr id="2" name="Slide Image Placeholder 1"/>
+          <p:cNvSpPr>
+            <a:spLocks noGrp="1" noRot="1" noChangeAspect="1"/>
+          </p:cNvSpPr>
+          <p:nvPr>
+            <p:ph type="sldImg"/>
+          </p:nvPr>
+        </p:nvSpPr>
+        <p:spPr/>
+      </p:sp>
+      <p:sp>
+        <p:nvSpPr>
+          <p:cNvPr id="3" name="Notes Placeholder 2"/>
+          <p:cNvSpPr>
+            <a:spLocks noGrp="1"/>
+          </p:cNvSpPr>
+          <p:nvPr>
+            <p:ph type="body" idx="1"/>
+          </p:nvPr>
+        </p:nvSpPr>
+        <p:spPr/>
+        <p:txBody>
+          <a:bodyPr/>
+          <a:lstStyle/>
+          <a:p>
+            <a:r>
+              <a:rPr lang="en-US" dirty="0"/>
+              <a:t>https://en.wikipedia.org/wiki/Executable_and_Linkable_Format</a:t>
+            </a:r>
+          </a:p>
+          <a:p>
+            <a:r>
+              <a:rPr lang="en-US" dirty="0"/>
+              <a:t>https://en.wikipedia.org/wiki/Portable_Executable</a:t>
+            </a:r>
+          </a:p>
+        </p:txBody>
+      </p:sp>
+      <p:sp>
+        <p:nvSpPr>
+          <p:cNvPr id="4" name="Slide Number Placeholder 3"/>
+          <p:cNvSpPr>
+            <a:spLocks noGrp="1"/>
+          </p:cNvSpPr>
+          <p:nvPr>
+            <p:ph type="sldNum" sz="quarter" idx="5"/>
+          </p:nvPr>
+        </p:nvSpPr>
+        <p:spPr/>
+        <p:txBody>
+          <a:bodyPr/>
+          <a:lstStyle/>
+          <a:p>
+            <a:fld id="{BE457D5F-ED05-449E-97D0-205DAB987247}" type="slidenum">
+              <a:rPr lang="en-US" smtClean="0"/>
+              <a:t>2</a:t>
+            </a:fld>
+            <a:endParaRPr lang="en-US"/>
+          </a:p>
+        </p:txBody>
+      </p:sp>
+    </p:spTree>
+    <p:extLst>
+      <p:ext uri="{BB962C8B-B14F-4D97-AF65-F5344CB8AC3E}">
+        <p14:creationId xmlns:p14="http://schemas.microsoft.com/office/powerpoint/2010/main" val="2485719891"/>
+      </p:ext>
+    </p:extLst>
+  </p:cSld>
+  <p:clrMapOvr>
+    <a:masterClrMapping/>
+  </p:clrMapOvr>
+</p:notes>
+</file>
+
+<file path=ppt/notesSlides/notesSlide2.xml><?xml version="1.0" encoding="utf-8"?>
+<p:notes xmlns:a="http://schemas.openxmlformats.org/drawingml/2006/main" xmlns:r="http://schemas.openxmlformats.org/officeDocument/2006/relationships" xmlns:p="http://schemas.openxmlformats.org/presentationml/2006/main">
+  <p:cSld>
+    <p:spTree>
+      <p:nvGrpSpPr>
+        <p:cNvPr id="1" name=""/>
+        <p:cNvGrpSpPr/>
+        <p:nvPr/>
+      </p:nvGrpSpPr>
+      <p:grpSpPr>
+        <a:xfrm>
+          <a:off x="0" y="0"/>
+          <a:ext cx="0" cy="0"/>
+          <a:chOff x="0" y="0"/>
+          <a:chExt cx="0" cy="0"/>
+        </a:xfrm>
+      </p:grpSpPr>
+      <p:sp>
+        <p:nvSpPr>
+          <p:cNvPr id="2" name="Slide Image Placeholder 1"/>
+          <p:cNvSpPr>
+            <a:spLocks noGrp="1" noRot="1" noChangeAspect="1"/>
+          </p:cNvSpPr>
+          <p:nvPr>
+            <p:ph type="sldImg"/>
+          </p:nvPr>
+        </p:nvSpPr>
+        <p:spPr/>
+      </p:sp>
+      <p:sp>
+        <p:nvSpPr>
+          <p:cNvPr id="3" name="Notes Placeholder 2"/>
+          <p:cNvSpPr>
+            <a:spLocks noGrp="1"/>
+          </p:cNvSpPr>
+          <p:nvPr>
+            <p:ph type="body" idx="1"/>
+          </p:nvPr>
+        </p:nvSpPr>
+        <p:spPr/>
+        <p:txBody>
+          <a:bodyPr/>
+          <a:lstStyle/>
+          <a:p>
+            <a:endParaRPr lang="en-US" dirty="0"/>
+          </a:p>
+        </p:txBody>
+      </p:sp>
+      <p:sp>
+        <p:nvSpPr>
+          <p:cNvPr id="4" name="Slide Number Placeholder 3"/>
+          <p:cNvSpPr>
+            <a:spLocks noGrp="1"/>
+          </p:cNvSpPr>
+          <p:nvPr>
+            <p:ph type="sldNum" sz="quarter" idx="5"/>
+          </p:nvPr>
+        </p:nvSpPr>
+        <p:spPr/>
+        <p:txBody>
+          <a:bodyPr/>
+          <a:lstStyle/>
+          <a:p>
+            <a:fld id="{BE457D5F-ED05-449E-97D0-205DAB987247}" type="slidenum">
+              <a:rPr lang="en-US" smtClean="0"/>
+              <a:t>11</a:t>
+            </a:fld>
+            <a:endParaRPr lang="en-US"/>
+          </a:p>
+        </p:txBody>
+      </p:sp>
+    </p:spTree>
+    <p:extLst>
+      <p:ext uri="{BB962C8B-B14F-4D97-AF65-F5344CB8AC3E}">
+        <p14:creationId xmlns:p14="http://schemas.microsoft.com/office/powerpoint/2010/main" val="2506943311"/>
+      </p:ext>
+    </p:extLst>
+  </p:cSld>
+  <p:clrMapOvr>
+    <a:masterClrMapping/>
+  </p:clrMapOvr>
+</p:notes>
+</file>
+
+<file path=ppt/notesSlides/notesSlide3.xml><?xml version="1.0" encoding="utf-8"?>
+<p:notes xmlns:a="http://schemas.openxmlformats.org/drawingml/2006/main" xmlns:r="http://schemas.openxmlformats.org/officeDocument/2006/relationships" xmlns:p="http://schemas.openxmlformats.org/presentationml/2006/main">
+  <p:cSld>
+    <p:spTree>
+      <p:nvGrpSpPr>
+        <p:cNvPr id="1" name=""/>
+        <p:cNvGrpSpPr/>
+        <p:nvPr/>
+      </p:nvGrpSpPr>
+      <p:grpSpPr>
+        <a:xfrm>
+          <a:off x="0" y="0"/>
+          <a:ext cx="0" cy="0"/>
+          <a:chOff x="0" y="0"/>
+          <a:chExt cx="0" cy="0"/>
+        </a:xfrm>
+      </p:grpSpPr>
+      <p:sp>
+        <p:nvSpPr>
+          <p:cNvPr id="2" name="Slide Image Placeholder 1"/>
+          <p:cNvSpPr>
+            <a:spLocks noGrp="1" noRot="1" noChangeAspect="1"/>
+          </p:cNvSpPr>
+          <p:nvPr>
+            <p:ph type="sldImg"/>
+          </p:nvPr>
+        </p:nvSpPr>
+        <p:spPr/>
+      </p:sp>
+      <p:sp>
+        <p:nvSpPr>
+          <p:cNvPr id="3" name="Notes Placeholder 2"/>
+          <p:cNvSpPr>
+            <a:spLocks noGrp="1"/>
+          </p:cNvSpPr>
+          <p:nvPr>
+            <p:ph type="body" idx="1"/>
+          </p:nvPr>
+        </p:nvSpPr>
+        <p:spPr/>
+        <p:txBody>
+          <a:bodyPr/>
+          <a:lstStyle/>
+          <a:p>
+            <a:r>
+              <a:rPr lang="en-US" dirty="0"/>
+              <a:t>Top one is the version of python pulled from PATH</a:t>
+            </a:r>
+          </a:p>
+          <a:p>
+            <a:r>
+              <a:rPr lang="en-US" dirty="0"/>
+              <a:t>Middle one is the active interpreter that VS Code is using to do syntax highlighting</a:t>
+            </a:r>
+          </a:p>
+          <a:p>
+            <a:r>
+              <a:rPr lang="en-US" dirty="0"/>
+              <a:t>Bottom one is the virtual environment’s interpreter that is being used by the </a:t>
+            </a:r>
+            <a:r>
+              <a:rPr lang="en-US" dirty="0" err="1"/>
+              <a:t>Jupyter</a:t>
+            </a:r>
+            <a:r>
+              <a:rPr lang="en-US" dirty="0"/>
+              <a:t> Notebook kernel</a:t>
+            </a:r>
+          </a:p>
+          <a:p>
+            <a:endParaRPr lang="en-US" dirty="0"/>
+          </a:p>
+          <a:p>
+            <a:r>
+              <a:rPr lang="en-US" dirty="0"/>
+              <a:t>All three are pointing to different python executables!</a:t>
+            </a:r>
+          </a:p>
+        </p:txBody>
+      </p:sp>
+      <p:sp>
+        <p:nvSpPr>
+          <p:cNvPr id="4" name="Slide Number Placeholder 3"/>
+          <p:cNvSpPr>
+            <a:spLocks noGrp="1"/>
+          </p:cNvSpPr>
+          <p:nvPr>
+            <p:ph type="sldNum" sz="quarter" idx="5"/>
+          </p:nvPr>
+        </p:nvSpPr>
+        <p:spPr/>
+        <p:txBody>
+          <a:bodyPr/>
+          <a:lstStyle/>
+          <a:p>
+            <a:fld id="{BE457D5F-ED05-449E-97D0-205DAB987247}" type="slidenum">
+              <a:rPr lang="en-US" smtClean="0"/>
+              <a:t>13</a:t>
+            </a:fld>
+            <a:endParaRPr lang="en-US"/>
+          </a:p>
+        </p:txBody>
+      </p:sp>
+    </p:spTree>
+    <p:extLst>
+      <p:ext uri="{BB962C8B-B14F-4D97-AF65-F5344CB8AC3E}">
+        <p14:creationId xmlns:p14="http://schemas.microsoft.com/office/powerpoint/2010/main" val="2066581409"/>
+      </p:ext>
+    </p:extLst>
+  </p:cSld>
+  <p:clrMapOvr>
+    <a:masterClrMapping/>
+  </p:clrMapOvr>
+</p:notes>
+</file>
+
+<file path=ppt/notesSlides/notesSlide4.xml><?xml version="1.0" encoding="utf-8"?>
+<p:notes xmlns:a="http://schemas.openxmlformats.org/drawingml/2006/main" xmlns:r="http://schemas.openxmlformats.org/officeDocument/2006/relationships" xmlns:p="http://schemas.openxmlformats.org/presentationml/2006/main">
+  <p:cSld>
+    <p:spTree>
+      <p:nvGrpSpPr>
+        <p:cNvPr id="1" name=""/>
+        <p:cNvGrpSpPr/>
+        <p:nvPr/>
+      </p:nvGrpSpPr>
+      <p:grpSpPr>
+        <a:xfrm>
+          <a:off x="0" y="0"/>
+          <a:ext cx="0" cy="0"/>
+          <a:chOff x="0" y="0"/>
+          <a:chExt cx="0" cy="0"/>
+        </a:xfrm>
+      </p:grpSpPr>
+      <p:sp>
+        <p:nvSpPr>
+          <p:cNvPr id="2" name="Slide Image Placeholder 1"/>
+          <p:cNvSpPr>
+            <a:spLocks noGrp="1" noRot="1" noChangeAspect="1"/>
+          </p:cNvSpPr>
+          <p:nvPr>
+            <p:ph type="sldImg"/>
+          </p:nvPr>
+        </p:nvSpPr>
+        <p:spPr/>
+      </p:sp>
+      <p:sp>
+        <p:nvSpPr>
+          <p:cNvPr id="3" name="Notes Placeholder 2"/>
+          <p:cNvSpPr>
+            <a:spLocks noGrp="1"/>
+          </p:cNvSpPr>
+          <p:nvPr>
+            <p:ph type="body" idx="1"/>
+          </p:nvPr>
+        </p:nvSpPr>
+        <p:spPr/>
+        <p:txBody>
+          <a:bodyPr/>
+          <a:lstStyle/>
+          <a:p>
+            <a:r>
+              <a:rPr lang="en-US" dirty="0"/>
+              <a:t>A larger view of the previous screenshots</a:t>
+            </a:r>
+          </a:p>
+          <a:p>
+            <a:endParaRPr lang="en-US" dirty="0"/>
+          </a:p>
+          <a:p>
+            <a:r>
+              <a:rPr lang="en-US" dirty="0"/>
+              <a:t>Read the command that VS Code enters for you when you press the play button (in blue text in the bottom terminal).  They type the full path to the exe and then the full path to your python script.</a:t>
+            </a:r>
+          </a:p>
+          <a:p>
+            <a:endParaRPr lang="en-US" dirty="0"/>
+          </a:p>
+          <a:p>
+            <a:r>
+              <a:rPr lang="en-US" dirty="0"/>
+              <a:t>Note that even though python --version shows 3.13.5 and the </a:t>
+            </a:r>
+            <a:r>
+              <a:rPr lang="en-US" dirty="0" err="1"/>
+              <a:t>venv</a:t>
+            </a:r>
+            <a:r>
+              <a:rPr lang="en-US" dirty="0"/>
+              <a:t> also shows 3.13.5, they’re actually both pointing to separate executable files.</a:t>
+            </a:r>
+          </a:p>
+        </p:txBody>
+      </p:sp>
+      <p:sp>
+        <p:nvSpPr>
+          <p:cNvPr id="4" name="Slide Number Placeholder 3"/>
+          <p:cNvSpPr>
+            <a:spLocks noGrp="1"/>
+          </p:cNvSpPr>
+          <p:nvPr>
+            <p:ph type="sldNum" sz="quarter" idx="5"/>
+          </p:nvPr>
+        </p:nvSpPr>
+        <p:spPr/>
+        <p:txBody>
+          <a:bodyPr/>
+          <a:lstStyle/>
+          <a:p>
+            <a:fld id="{BE457D5F-ED05-449E-97D0-205DAB987247}" type="slidenum">
+              <a:rPr lang="en-US" smtClean="0"/>
+              <a:t>14</a:t>
+            </a:fld>
+            <a:endParaRPr lang="en-US"/>
+          </a:p>
+        </p:txBody>
+      </p:sp>
+    </p:spTree>
+    <p:extLst>
+      <p:ext uri="{BB962C8B-B14F-4D97-AF65-F5344CB8AC3E}">
+        <p14:creationId xmlns:p14="http://schemas.microsoft.com/office/powerpoint/2010/main" val="3759656152"/>
+      </p:ext>
+    </p:extLst>
+  </p:cSld>
+  <p:clrMapOvr>
+    <a:masterClrMapping/>
+  </p:clrMapOvr>
+</p:notes>
 </file>
 
 <file path=ppt/slideLayouts/slideLayout1.xml><?xml version="1.0" encoding="utf-8"?>
@@ -3383,7 +4147,10 @@
           <a:bodyPr/>
           <a:lstStyle/>
           <a:p>
-            <a:endParaRPr lang="en-US"/>
+            <a:r>
+              <a:rPr lang="en-US" dirty="0"/>
+              <a:t>AI2C Techs</a:t>
+            </a:r>
           </a:p>
         </p:txBody>
       </p:sp>
@@ -3422,6 +4189,89 @@
           <p:cNvPr id="4" name="Title 3">
             <a:extLst>
               <a:ext uri="{FF2B5EF4-FFF2-40B4-BE49-F238E27FC236}">
+                <a16:creationId xmlns:a16="http://schemas.microsoft.com/office/drawing/2014/main" id="{66D940C8-04DC-F0F4-7ADA-2AFE9ADEC654}"/>
+              </a:ext>
+            </a:extLst>
+          </p:cNvPr>
+          <p:cNvSpPr>
+            <a:spLocks noGrp="1"/>
+          </p:cNvSpPr>
+          <p:nvPr>
+            <p:ph type="title"/>
+          </p:nvPr>
+        </p:nvSpPr>
+        <p:spPr/>
+        <p:txBody>
+          <a:bodyPr/>
+          <a:lstStyle/>
+          <a:p>
+            <a:r>
+              <a:rPr lang="en-US" dirty="0"/>
+              <a:t>Virtual Environments</a:t>
+            </a:r>
+          </a:p>
+        </p:txBody>
+      </p:sp>
+      <p:sp>
+        <p:nvSpPr>
+          <p:cNvPr id="5" name="Text Placeholder 4">
+            <a:extLst>
+              <a:ext uri="{FF2B5EF4-FFF2-40B4-BE49-F238E27FC236}">
+                <a16:creationId xmlns:a16="http://schemas.microsoft.com/office/drawing/2014/main" id="{3A3E69D4-E667-FE19-4190-0EE4A93ACC3D}"/>
+              </a:ext>
+            </a:extLst>
+          </p:cNvPr>
+          <p:cNvSpPr>
+            <a:spLocks noGrp="1"/>
+          </p:cNvSpPr>
+          <p:nvPr>
+            <p:ph type="body" idx="1"/>
+          </p:nvPr>
+        </p:nvSpPr>
+        <p:spPr/>
+        <p:txBody>
+          <a:bodyPr/>
+          <a:lstStyle/>
+          <a:p>
+            <a:endParaRPr lang="en-US"/>
+          </a:p>
+        </p:txBody>
+      </p:sp>
+    </p:spTree>
+    <p:extLst>
+      <p:ext uri="{BB962C8B-B14F-4D97-AF65-F5344CB8AC3E}">
+        <p14:creationId xmlns:p14="http://schemas.microsoft.com/office/powerpoint/2010/main" val="1738960769"/>
+      </p:ext>
+    </p:extLst>
+  </p:cSld>
+  <p:clrMapOvr>
+    <a:masterClrMapping/>
+  </p:clrMapOvr>
+</p:sld>
+</file>
+
+<file path=ppt/slides/slide11.xml><?xml version="1.0" encoding="utf-8"?>
+<p:sld xmlns:a="http://schemas.openxmlformats.org/drawingml/2006/main" xmlns:r="http://schemas.openxmlformats.org/officeDocument/2006/relationships" xmlns:p="http://schemas.openxmlformats.org/presentationml/2006/main">
+  <p:cSld>
+    <p:spTree>
+      <p:nvGrpSpPr>
+        <p:cNvPr id="1" name=""/>
+        <p:cNvGrpSpPr/>
+        <p:nvPr/>
+      </p:nvGrpSpPr>
+      <p:grpSpPr>
+        <a:xfrm>
+          <a:off x="0" y="0"/>
+          <a:ext cx="0" cy="0"/>
+          <a:chOff x="0" y="0"/>
+          <a:chExt cx="0" cy="0"/>
+        </a:xfrm>
+      </p:grpSpPr>
+      <p:sp>
+        <p:nvSpPr>
+          <p:cNvPr id="4" name="Title 3">
+            <a:extLst>
+              <a:ext uri="{FF2B5EF4-FFF2-40B4-BE49-F238E27FC236}">
                 <a16:creationId xmlns:a16="http://schemas.microsoft.com/office/drawing/2014/main" id="{6592B841-00FE-6472-A864-20EA95ABB18E}"/>
               </a:ext>
             </a:extLst>
@@ -3461,9 +4311,16 @@
             <p:ph idx="1"/>
           </p:nvPr>
         </p:nvSpPr>
-        <p:spPr/>
-        <p:txBody>
-          <a:bodyPr/>
+        <p:spPr>
+          <a:xfrm>
+            <a:off x="838200" y="1825624"/>
+            <a:ext cx="8738461" cy="4903421"/>
+          </a:xfrm>
+        </p:spPr>
+        <p:txBody>
+          <a:bodyPr>
+            <a:normAutofit lnSpcReduction="10000"/>
+          </a:bodyPr>
           <a:lstStyle/>
           <a:p>
             <a:r>
@@ -3486,13 +4343,40 @@
           <a:p>
             <a:r>
               <a:rPr lang="en-US" dirty="0"/>
-              <a:t>Creates some scripts and </a:t>
-            </a:r>
-            <a:r>
-              <a:rPr lang="en-US"/>
-              <a:t>config for later use</a:t>
-            </a:r>
+              <a:t>Creates some scripts and config for later use</a:t>
+            </a:r>
+          </a:p>
+          <a:p>
             <a:endParaRPr lang="en-US" dirty="0"/>
+          </a:p>
+          <a:p>
+            <a:r>
+              <a:rPr lang="en-US" dirty="0"/>
+              <a:t>Comes with its own trials and tribulations</a:t>
+            </a:r>
+          </a:p>
+          <a:p>
+            <a:endParaRPr lang="en-US" dirty="0"/>
+          </a:p>
+          <a:p>
+            <a:r>
+              <a:rPr lang="en-US" dirty="0"/>
+              <a:t>Inspect the contents of the Scripts folder, what do you notice?</a:t>
+            </a:r>
+          </a:p>
+          <a:p>
+            <a:r>
+              <a:rPr lang="en-US" dirty="0"/>
+              <a:t>Create a </a:t>
+            </a:r>
+            <a:r>
+              <a:rPr lang="en-US" dirty="0" err="1"/>
+              <a:t>venv</a:t>
+            </a:r>
+            <a:r>
+              <a:rPr lang="en-US" dirty="0"/>
+              <a:t> and inspect the activate.bat file, what do you notice? (look for manipulating the path variable)</a:t>
+            </a:r>
           </a:p>
           <a:p>
             <a:endParaRPr lang="en-US" dirty="0"/>
@@ -3514,7 +4398,7 @@
           <p:nvPr/>
         </p:nvPicPr>
         <p:blipFill>
-          <a:blip r:embed="rId2"/>
+          <a:blip r:embed="rId3"/>
           <a:stretch>
             <a:fillRect/>
           </a:stretch>
@@ -3542,89 +4426,6 @@
 </p:sld>
 </file>
 
-<file path=ppt/slides/slide11.xml><?xml version="1.0" encoding="utf-8"?>
-<p:sld xmlns:a="http://schemas.openxmlformats.org/drawingml/2006/main" xmlns:r="http://schemas.openxmlformats.org/officeDocument/2006/relationships" xmlns:p="http://schemas.openxmlformats.org/presentationml/2006/main">
-  <p:cSld>
-    <p:spTree>
-      <p:nvGrpSpPr>
-        <p:cNvPr id="1" name=""/>
-        <p:cNvGrpSpPr/>
-        <p:nvPr/>
-      </p:nvGrpSpPr>
-      <p:grpSpPr>
-        <a:xfrm>
-          <a:off x="0" y="0"/>
-          <a:ext cx="0" cy="0"/>
-          <a:chOff x="0" y="0"/>
-          <a:chExt cx="0" cy="0"/>
-        </a:xfrm>
-      </p:grpSpPr>
-      <p:sp>
-        <p:nvSpPr>
-          <p:cNvPr id="4" name="Title 3">
-            <a:extLst>
-              <a:ext uri="{FF2B5EF4-FFF2-40B4-BE49-F238E27FC236}">
-                <a16:creationId xmlns:a16="http://schemas.microsoft.com/office/drawing/2014/main" id="{5CC5B137-87D9-F90E-373F-0D20830C451A}"/>
-              </a:ext>
-            </a:extLst>
-          </p:cNvPr>
-          <p:cNvSpPr>
-            <a:spLocks noGrp="1"/>
-          </p:cNvSpPr>
-          <p:nvPr>
-            <p:ph type="title"/>
-          </p:nvPr>
-        </p:nvSpPr>
-        <p:spPr/>
-        <p:txBody>
-          <a:bodyPr/>
-          <a:lstStyle/>
-          <a:p>
-            <a:r>
-              <a:rPr lang="en-US" dirty="0"/>
-              <a:t>VS Code</a:t>
-            </a:r>
-          </a:p>
-        </p:txBody>
-      </p:sp>
-      <p:sp>
-        <p:nvSpPr>
-          <p:cNvPr id="5" name="Text Placeholder 4">
-            <a:extLst>
-              <a:ext uri="{FF2B5EF4-FFF2-40B4-BE49-F238E27FC236}">
-                <a16:creationId xmlns:a16="http://schemas.microsoft.com/office/drawing/2014/main" id="{C041B2F9-7E33-6DB6-D348-00DFAAEC3EC0}"/>
-              </a:ext>
-            </a:extLst>
-          </p:cNvPr>
-          <p:cNvSpPr>
-            <a:spLocks noGrp="1"/>
-          </p:cNvSpPr>
-          <p:nvPr>
-            <p:ph type="body" idx="1"/>
-          </p:nvPr>
-        </p:nvSpPr>
-        <p:spPr/>
-        <p:txBody>
-          <a:bodyPr/>
-          <a:lstStyle/>
-          <a:p>
-            <a:endParaRPr lang="en-US"/>
-          </a:p>
-        </p:txBody>
-      </p:sp>
-    </p:spTree>
-    <p:extLst>
-      <p:ext uri="{BB962C8B-B14F-4D97-AF65-F5344CB8AC3E}">
-        <p14:creationId xmlns:p14="http://schemas.microsoft.com/office/powerpoint/2010/main" val="4133213507"/>
-      </p:ext>
-    </p:extLst>
-  </p:cSld>
-  <p:clrMapOvr>
-    <a:masterClrMapping/>
-  </p:clrMapOvr>
-</p:sld>
-</file>
-
 <file path=ppt/slides/slide12.xml><?xml version="1.0" encoding="utf-8"?>
 <p:sld xmlns:a="http://schemas.openxmlformats.org/drawingml/2006/main" xmlns:r="http://schemas.openxmlformats.org/officeDocument/2006/relationships" xmlns:p="http://schemas.openxmlformats.org/presentationml/2006/main">
   <p:cSld>
@@ -3647,6 +4448,89 @@
           <p:cNvPr id="4" name="Title 3">
             <a:extLst>
               <a:ext uri="{FF2B5EF4-FFF2-40B4-BE49-F238E27FC236}">
+                <a16:creationId xmlns:a16="http://schemas.microsoft.com/office/drawing/2014/main" id="{5CC5B137-87D9-F90E-373F-0D20830C451A}"/>
+              </a:ext>
+            </a:extLst>
+          </p:cNvPr>
+          <p:cNvSpPr>
+            <a:spLocks noGrp="1"/>
+          </p:cNvSpPr>
+          <p:nvPr>
+            <p:ph type="title"/>
+          </p:nvPr>
+        </p:nvSpPr>
+        <p:spPr/>
+        <p:txBody>
+          <a:bodyPr/>
+          <a:lstStyle/>
+          <a:p>
+            <a:r>
+              <a:rPr lang="en-US" dirty="0"/>
+              <a:t>VS Code</a:t>
+            </a:r>
+          </a:p>
+        </p:txBody>
+      </p:sp>
+      <p:sp>
+        <p:nvSpPr>
+          <p:cNvPr id="5" name="Text Placeholder 4">
+            <a:extLst>
+              <a:ext uri="{FF2B5EF4-FFF2-40B4-BE49-F238E27FC236}">
+                <a16:creationId xmlns:a16="http://schemas.microsoft.com/office/drawing/2014/main" id="{C041B2F9-7E33-6DB6-D348-00DFAAEC3EC0}"/>
+              </a:ext>
+            </a:extLst>
+          </p:cNvPr>
+          <p:cNvSpPr>
+            <a:spLocks noGrp="1"/>
+          </p:cNvSpPr>
+          <p:nvPr>
+            <p:ph type="body" idx="1"/>
+          </p:nvPr>
+        </p:nvSpPr>
+        <p:spPr/>
+        <p:txBody>
+          <a:bodyPr/>
+          <a:lstStyle/>
+          <a:p>
+            <a:endParaRPr lang="en-US"/>
+          </a:p>
+        </p:txBody>
+      </p:sp>
+    </p:spTree>
+    <p:extLst>
+      <p:ext uri="{BB962C8B-B14F-4D97-AF65-F5344CB8AC3E}">
+        <p14:creationId xmlns:p14="http://schemas.microsoft.com/office/powerpoint/2010/main" val="4133213507"/>
+      </p:ext>
+    </p:extLst>
+  </p:cSld>
+  <p:clrMapOvr>
+    <a:masterClrMapping/>
+  </p:clrMapOvr>
+</p:sld>
+</file>
+
+<file path=ppt/slides/slide13.xml><?xml version="1.0" encoding="utf-8"?>
+<p:sld xmlns:a="http://schemas.openxmlformats.org/drawingml/2006/main" xmlns:r="http://schemas.openxmlformats.org/officeDocument/2006/relationships" xmlns:p="http://schemas.openxmlformats.org/presentationml/2006/main">
+  <p:cSld>
+    <p:spTree>
+      <p:nvGrpSpPr>
+        <p:cNvPr id="1" name=""/>
+        <p:cNvGrpSpPr/>
+        <p:nvPr/>
+      </p:nvGrpSpPr>
+      <p:grpSpPr>
+        <a:xfrm>
+          <a:off x="0" y="0"/>
+          <a:ext cx="0" cy="0"/>
+          <a:chOff x="0" y="0"/>
+          <a:chExt cx="0" cy="0"/>
+        </a:xfrm>
+      </p:grpSpPr>
+      <p:sp>
+        <p:nvSpPr>
+          <p:cNvPr id="4" name="Title 3">
+            <a:extLst>
+              <a:ext uri="{FF2B5EF4-FFF2-40B4-BE49-F238E27FC236}">
                 <a16:creationId xmlns:a16="http://schemas.microsoft.com/office/drawing/2014/main" id="{BD0193CF-D0CD-139F-AAB8-50CC580D2C43}"/>
               </a:ext>
             </a:extLst>
@@ -3685,7 +4569,7 @@
           <p:nvPr/>
         </p:nvPicPr>
         <p:blipFill>
-          <a:blip r:embed="rId2"/>
+          <a:blip r:embed="rId3"/>
           <a:stretch>
             <a:fillRect/>
           </a:stretch>
@@ -3715,7 +4599,7 @@
           <p:nvPr/>
         </p:nvPicPr>
         <p:blipFill>
-          <a:blip r:embed="rId3"/>
+          <a:blip r:embed="rId4"/>
           <a:stretch>
             <a:fillRect/>
           </a:stretch>
@@ -3745,7 +4629,7 @@
           <p:nvPr/>
         </p:nvPicPr>
         <p:blipFill>
-          <a:blip r:embed="rId4"/>
+          <a:blip r:embed="rId5"/>
           <a:stretch>
             <a:fillRect/>
           </a:stretch>
@@ -3938,7 +4822,7 @@
 </p:sld>
 </file>
 
-<file path=ppt/slides/slide13.xml><?xml version="1.0" encoding="utf-8"?>
+<file path=ppt/slides/slide14.xml><?xml version="1.0" encoding="utf-8"?>
 <p:sld xmlns:a="http://schemas.openxmlformats.org/drawingml/2006/main" xmlns:r="http://schemas.openxmlformats.org/officeDocument/2006/relationships" xmlns:p="http://schemas.openxmlformats.org/presentationml/2006/main">
   <p:cSld>
     <p:spTree>
@@ -3970,7 +4854,7 @@
           <p:nvPr/>
         </p:nvPicPr>
         <p:blipFill>
-          <a:blip r:embed="rId2"/>
+          <a:blip r:embed="rId3"/>
           <a:stretch>
             <a:fillRect/>
           </a:stretch>
@@ -4329,7 +5213,7 @@
 </p:sld>
 </file>
 
-<file path=ppt/slides/slide14.xml><?xml version="1.0" encoding="utf-8"?>
+<file path=ppt/slides/slide15.xml><?xml version="1.0" encoding="utf-8"?>
 <p:sld xmlns:a="http://schemas.openxmlformats.org/drawingml/2006/main" xmlns:r="http://schemas.openxmlformats.org/officeDocument/2006/relationships" xmlns:p="http://schemas.openxmlformats.org/presentationml/2006/main">
   <p:cSld>
     <p:spTree>
@@ -4539,18 +5423,99 @@
             <a:spLocks noGrp="1"/>
           </p:cNvSpPr>
           <p:nvPr>
-            <p:ph idx="1"/>
-          </p:nvPr>
-        </p:nvSpPr>
-        <p:spPr/>
-        <p:txBody>
-          <a:bodyPr/>
-          <a:lstStyle/>
+            <p:ph sz="half" idx="1"/>
+          </p:nvPr>
+        </p:nvSpPr>
+        <p:spPr/>
+        <p:txBody>
+          <a:bodyPr/>
+          <a:lstStyle/>
+          <a:p>
+            <a:r>
+              <a:rPr lang="en-US" dirty="0"/>
+              <a:t>A binary file (typically)</a:t>
+            </a:r>
+          </a:p>
+          <a:p>
+            <a:r>
+              <a:rPr lang="en-US" dirty="0"/>
+              <a:t>Contains instructions and data</a:t>
+            </a:r>
+          </a:p>
+          <a:p>
+            <a:r>
+              <a:rPr lang="en-US" dirty="0"/>
+              <a:t>The operating system loads the instructions and data and creates a </a:t>
+            </a:r>
+            <a:r>
+              <a:rPr lang="en-US" i="1" dirty="0"/>
+              <a:t>process</a:t>
+            </a:r>
+            <a:r>
+              <a:rPr lang="en-US" dirty="0"/>
+              <a:t> to track the state of the executable</a:t>
+            </a:r>
+          </a:p>
+          <a:p>
+            <a:r>
+              <a:rPr lang="en-US" dirty="0"/>
+              <a:t>The process gets (eventually) scheduled for execution on the CPU</a:t>
+            </a:r>
+          </a:p>
           <a:p>
             <a:endParaRPr lang="en-US" dirty="0"/>
           </a:p>
         </p:txBody>
       </p:sp>
+      <p:pic>
+        <p:nvPicPr>
+          <p:cNvPr id="5" name="Picture 2">
+            <a:extLst>
+              <a:ext uri="{FF2B5EF4-FFF2-40B4-BE49-F238E27FC236}">
+                <a16:creationId xmlns:a16="http://schemas.microsoft.com/office/drawing/2014/main" id="{85575BB3-D737-7ABC-3723-67C2D4560319}"/>
+              </a:ext>
+            </a:extLst>
+          </p:cNvPr>
+          <p:cNvPicPr>
+            <a:picLocks noGrp="1" noChangeAspect="1" noChangeArrowheads="1"/>
+          </p:cNvPicPr>
+          <p:nvPr>
+            <p:ph sz="half" idx="2"/>
+          </p:nvPr>
+        </p:nvPicPr>
+        <p:blipFill>
+          <a:blip r:embed="rId3">
+            <a:extLst>
+              <a:ext uri="{28A0092B-C50C-407E-A947-70E740481C1C}">
+                <a14:useLocalDpi xmlns:a14="http://schemas.microsoft.com/office/drawing/2010/main" val="0"/>
+              </a:ext>
+            </a:extLst>
+          </a:blip>
+          <a:srcRect/>
+          <a:stretch>
+            <a:fillRect/>
+          </a:stretch>
+        </p:blipFill>
+        <p:spPr bwMode="auto">
+          <a:xfrm>
+            <a:off x="7191375" y="2258219"/>
+            <a:ext cx="3143250" cy="3486150"/>
+          </a:xfrm>
+          <a:prstGeom prst="rect">
+            <a:avLst/>
+          </a:prstGeom>
+          <a:noFill/>
+          <a:extLst>
+            <a:ext uri="{909E8E84-426E-40DD-AFC4-6F175D3DCCD1}">
+              <a14:hiddenFill xmlns:a14="http://schemas.microsoft.com/office/drawing/2010/main">
+                <a:solidFill>
+                  <a:srgbClr val="FFFFFF"/>
+                </a:solidFill>
+              </a14:hiddenFill>
+            </a:ext>
+          </a:extLst>
+        </p:spPr>
+      </p:pic>
     </p:spTree>
     <p:extLst>
       <p:ext uri="{BB962C8B-B14F-4D97-AF65-F5344CB8AC3E}">
@@ -4630,7 +5595,31 @@
           <a:bodyPr/>
           <a:lstStyle/>
           <a:p>
-            <a:endParaRPr lang="en-US"/>
+            <a:r>
+              <a:rPr lang="en-US" dirty="0"/>
+              <a:t>Double-click an icon</a:t>
+            </a:r>
+          </a:p>
+          <a:p>
+            <a:r>
+              <a:rPr lang="en-US" dirty="0"/>
+              <a:t>At startup</a:t>
+            </a:r>
+          </a:p>
+          <a:p>
+            <a:r>
+              <a:rPr lang="en-US" dirty="0"/>
+              <a:t>Type a command on the command-line</a:t>
+            </a:r>
+          </a:p>
+          <a:p>
+            <a:endParaRPr lang="en-US" dirty="0"/>
+          </a:p>
+          <a:p>
+            <a:r>
+              <a:rPr lang="en-US" dirty="0"/>
+              <a:t>Operating system handles the rest</a:t>
+            </a:r>
           </a:p>
         </p:txBody>
       </p:sp>
@@ -4694,29 +5683,98 @@
       </p:sp>
       <p:sp>
         <p:nvSpPr>
-          <p:cNvPr id="3" name="Content Placeholder 2">
-            <a:extLst>
-              <a:ext uri="{FF2B5EF4-FFF2-40B4-BE49-F238E27FC236}">
-                <a16:creationId xmlns:a16="http://schemas.microsoft.com/office/drawing/2014/main" id="{C592F295-62F4-FD3E-CE1C-847E5A051293}"/>
-              </a:ext>
-            </a:extLst>
-          </p:cNvPr>
-          <p:cNvSpPr>
-            <a:spLocks noGrp="1"/>
-          </p:cNvSpPr>
-          <p:nvPr>
-            <p:ph idx="1"/>
-          </p:nvPr>
-        </p:nvSpPr>
-        <p:spPr/>
-        <p:txBody>
-          <a:bodyPr/>
-          <a:lstStyle/>
-          <a:p>
-            <a:endParaRPr lang="en-US"/>
-          </a:p>
-        </p:txBody>
-      </p:sp>
+          <p:cNvPr id="6" name="Content Placeholder 5">
+            <a:extLst>
+              <a:ext uri="{FF2B5EF4-FFF2-40B4-BE49-F238E27FC236}">
+                <a16:creationId xmlns:a16="http://schemas.microsoft.com/office/drawing/2014/main" id="{818D3BB1-F826-5753-39B9-EDA271169D85}"/>
+              </a:ext>
+            </a:extLst>
+          </p:cNvPr>
+          <p:cNvSpPr>
+            <a:spLocks noGrp="1"/>
+          </p:cNvSpPr>
+          <p:nvPr>
+            <p:ph sz="half" idx="2"/>
+          </p:nvPr>
+        </p:nvSpPr>
+        <p:spPr>
+          <a:xfrm>
+            <a:off x="7385538" y="1297216"/>
+            <a:ext cx="5181600" cy="4351338"/>
+          </a:xfrm>
+        </p:spPr>
+        <p:txBody>
+          <a:bodyPr>
+            <a:normAutofit/>
+          </a:bodyPr>
+          <a:lstStyle/>
+          <a:p>
+            <a:r>
+              <a:rPr lang="en-US" dirty="0"/>
+              <a:t>Typically stored on the local file system</a:t>
+            </a:r>
+          </a:p>
+          <a:p>
+            <a:r>
+              <a:rPr lang="en-US" dirty="0"/>
+              <a:t>The OS needs to know the location so it can process/load the file contents</a:t>
+            </a:r>
+          </a:p>
+          <a:p>
+            <a:endParaRPr lang="en-US" dirty="0"/>
+          </a:p>
+          <a:p>
+            <a:r>
+              <a:rPr lang="en-US" dirty="0"/>
+              <a:t>In theory, we need to type the full path to the executable </a:t>
+            </a:r>
+          </a:p>
+          <a:p>
+            <a:r>
+              <a:rPr lang="en-US" dirty="0"/>
+              <a:t>Why don’t we though? </a:t>
+            </a:r>
+          </a:p>
+          <a:p>
+            <a:endParaRPr lang="en-US" dirty="0"/>
+          </a:p>
+          <a:p>
+            <a:endParaRPr lang="en-US" dirty="0"/>
+          </a:p>
+        </p:txBody>
+      </p:sp>
+      <p:pic>
+        <p:nvPicPr>
+          <p:cNvPr id="8" name="Content Placeholder 7">
+            <a:extLst>
+              <a:ext uri="{FF2B5EF4-FFF2-40B4-BE49-F238E27FC236}">
+                <a16:creationId xmlns:a16="http://schemas.microsoft.com/office/drawing/2014/main" id="{E7D1E45F-5693-CDE7-2BB0-9D6573841A2A}"/>
+              </a:ext>
+            </a:extLst>
+          </p:cNvPr>
+          <p:cNvPicPr>
+            <a:picLocks noGrp="1" noChangeAspect="1"/>
+          </p:cNvPicPr>
+          <p:nvPr>
+            <p:ph sz="half" idx="1"/>
+          </p:nvPr>
+        </p:nvPicPr>
+        <p:blipFill>
+          <a:blip r:embed="rId2"/>
+          <a:stretch>
+            <a:fillRect/>
+          </a:stretch>
+        </p:blipFill>
+        <p:spPr>
+          <a:xfrm>
+            <a:off x="0" y="1297216"/>
+            <a:ext cx="7385538" cy="4767609"/>
+          </a:xfrm>
+          <a:prstGeom prst="rect">
+            <a:avLst/>
+          </a:prstGeom>
+        </p:spPr>
+      </p:pic>
     </p:spTree>
     <p:extLst>
       <p:ext uri="{BB962C8B-B14F-4D97-AF65-F5344CB8AC3E}">
@@ -4928,13 +5986,105 @@
         </p:nvSpPr>
         <p:spPr/>
         <p:txBody>
-          <a:bodyPr/>
+          <a:bodyPr>
+            <a:normAutofit/>
+          </a:bodyPr>
           <a:lstStyle/>
           <a:p>
             <a:r>
               <a:rPr lang="en-US" dirty="0"/>
-              <a:t>User and System</a:t>
-            </a:r>
+              <a:t>System Properties </a:t>
+            </a:r>
+            <a:r>
+              <a:rPr lang="en-US" dirty="0">
+                <a:sym typeface="Wingdings" panose="05000000000000000000" pitchFamily="2" charset="2"/>
+              </a:rPr>
+              <a:t> Environment Variables  Path</a:t>
+            </a:r>
+          </a:p>
+          <a:p>
+            <a:r>
+              <a:rPr lang="en-US" dirty="0" err="1">
+                <a:sym typeface="Wingdings" panose="05000000000000000000" pitchFamily="2" charset="2"/>
+              </a:rPr>
+              <a:t>Powershell</a:t>
+            </a:r>
+            <a:r>
+              <a:rPr lang="en-US" dirty="0">
+                <a:sym typeface="Wingdings" panose="05000000000000000000" pitchFamily="2" charset="2"/>
+              </a:rPr>
+              <a:t>: </a:t>
+            </a:r>
+            <a:r>
+              <a:rPr lang="en-US" dirty="0">
+                <a:latin typeface="Courier New" panose="02070309020205020404" pitchFamily="49" charset="0"/>
+                <a:cs typeface="Courier New" panose="02070309020205020404" pitchFamily="49" charset="0"/>
+                <a:sym typeface="Wingdings" panose="05000000000000000000" pitchFamily="2" charset="2"/>
+              </a:rPr>
+              <a:t>$</a:t>
+            </a:r>
+            <a:r>
+              <a:rPr lang="en-US" dirty="0" err="1">
+                <a:latin typeface="Courier New" panose="02070309020205020404" pitchFamily="49" charset="0"/>
+                <a:cs typeface="Courier New" panose="02070309020205020404" pitchFamily="49" charset="0"/>
+                <a:sym typeface="Wingdings" panose="05000000000000000000" pitchFamily="2" charset="2"/>
+              </a:rPr>
+              <a:t>env:path</a:t>
+            </a:r>
+            <a:endParaRPr lang="en-US" dirty="0">
+              <a:latin typeface="Courier New" panose="02070309020205020404" pitchFamily="49" charset="0"/>
+              <a:cs typeface="Courier New" panose="02070309020205020404" pitchFamily="49" charset="0"/>
+              <a:sym typeface="Wingdings" panose="05000000000000000000" pitchFamily="2" charset="2"/>
+            </a:endParaRPr>
+          </a:p>
+          <a:p>
+            <a:r>
+              <a:rPr lang="en-US" dirty="0" err="1">
+                <a:sym typeface="Wingdings" panose="05000000000000000000" pitchFamily="2" charset="2"/>
+              </a:rPr>
+              <a:t>Cmd</a:t>
+            </a:r>
+            <a:r>
+              <a:rPr lang="en-US" dirty="0">
+                <a:sym typeface="Wingdings" panose="05000000000000000000" pitchFamily="2" charset="2"/>
+              </a:rPr>
+              <a:t>: </a:t>
+            </a:r>
+            <a:r>
+              <a:rPr lang="en-US" dirty="0">
+                <a:latin typeface="Courier New" panose="02070309020205020404" pitchFamily="49" charset="0"/>
+                <a:cs typeface="Courier New" panose="02070309020205020404" pitchFamily="49" charset="0"/>
+                <a:sym typeface="Wingdings" panose="05000000000000000000" pitchFamily="2" charset="2"/>
+              </a:rPr>
+              <a:t>set path</a:t>
+            </a:r>
+          </a:p>
+          <a:p>
+            <a:pPr marL="0" indent="0">
+              <a:buNone/>
+            </a:pPr>
+            <a:endParaRPr lang="en-US" dirty="0">
+              <a:sym typeface="Wingdings" panose="05000000000000000000" pitchFamily="2" charset="2"/>
+            </a:endParaRPr>
+          </a:p>
+          <a:p>
+            <a:r>
+              <a:rPr lang="en-US" dirty="0">
+                <a:sym typeface="Wingdings" panose="05000000000000000000" pitchFamily="2" charset="2"/>
+              </a:rPr>
+              <a:t>What does it look like?</a:t>
+            </a:r>
+          </a:p>
+          <a:p>
+            <a:r>
+              <a:rPr lang="en-US" dirty="0">
+                <a:sym typeface="Wingdings" panose="05000000000000000000" pitchFamily="2" charset="2"/>
+              </a:rPr>
+              <a:t>System and user level</a:t>
+            </a:r>
+          </a:p>
+          <a:p>
+            <a:endParaRPr lang="en-US" dirty="0"/>
           </a:p>
         </p:txBody>
       </p:sp>
@@ -4984,10 +6134,23 @@
         </p:nvSpPr>
         <p:spPr/>
         <p:txBody>
-          <a:bodyPr/>
-          <a:lstStyle/>
-          <a:p>
-            <a:endParaRPr lang="en-US"/>
+          <a:bodyPr>
+            <a:normAutofit/>
+          </a:bodyPr>
+          <a:lstStyle/>
+          <a:p>
+            <a:r>
+              <a:rPr lang="en-US" dirty="0">
+                <a:latin typeface="Courier New" panose="02070309020205020404" pitchFamily="49" charset="0"/>
+                <a:cs typeface="Courier New" panose="02070309020205020404" pitchFamily="49" charset="0"/>
+              </a:rPr>
+              <a:t>echo $PATH</a:t>
+            </a:r>
+          </a:p>
+          <a:p>
+            <a:endParaRPr lang="en-US" dirty="0">
+              <a:cs typeface="Courier New" panose="02070309020205020404" pitchFamily="49" charset="0"/>
+            </a:endParaRPr>
           </a:p>
         </p:txBody>
       </p:sp>
@@ -5156,7 +6319,10 @@
           <a:bodyPr/>
           <a:lstStyle/>
           <a:p>
-            <a:endParaRPr lang="en-US" dirty="0"/>
+            <a:r>
+              <a:rPr lang="en-US" dirty="0"/>
+              <a:t>What do you think happens?</a:t>
+            </a:r>
           </a:p>
         </p:txBody>
       </p:sp>
@@ -5192,10 +6358,10 @@
       </p:grpSpPr>
       <p:sp>
         <p:nvSpPr>
-          <p:cNvPr id="4" name="Title 3">
-            <a:extLst>
-              <a:ext uri="{FF2B5EF4-FFF2-40B4-BE49-F238E27FC236}">
-                <a16:creationId xmlns:a16="http://schemas.microsoft.com/office/drawing/2014/main" id="{66D940C8-04DC-F0F4-7ADA-2AFE9ADEC654}"/>
+          <p:cNvPr id="2" name="Title 1">
+            <a:extLst>
+              <a:ext uri="{FF2B5EF4-FFF2-40B4-BE49-F238E27FC236}">
+                <a16:creationId xmlns:a16="http://schemas.microsoft.com/office/drawing/2014/main" id="{D6283BEB-6B8A-4F55-D4E5-5B6F95718146}"/>
               </a:ext>
             </a:extLst>
           </p:cNvPr>
@@ -5213,40 +6379,61 @@
           <a:p>
             <a:r>
               <a:rPr lang="en-US" dirty="0"/>
-              <a:t>Virtual Environments</a:t>
-            </a:r>
-          </a:p>
-        </p:txBody>
-      </p:sp>
-      <p:sp>
-        <p:nvSpPr>
-          <p:cNvPr id="5" name="Text Placeholder 4">
-            <a:extLst>
-              <a:ext uri="{FF2B5EF4-FFF2-40B4-BE49-F238E27FC236}">
-                <a16:creationId xmlns:a16="http://schemas.microsoft.com/office/drawing/2014/main" id="{3A3E69D4-E667-FE19-4190-0EE4A93ACC3D}"/>
-              </a:ext>
-            </a:extLst>
-          </p:cNvPr>
-          <p:cNvSpPr>
-            <a:spLocks noGrp="1"/>
-          </p:cNvSpPr>
-          <p:nvPr>
-            <p:ph type="body" idx="1"/>
-          </p:nvPr>
-        </p:nvSpPr>
-        <p:spPr/>
-        <p:txBody>
-          <a:bodyPr/>
-          <a:lstStyle/>
-          <a:p>
-            <a:endParaRPr lang="en-US"/>
+              <a:t>A Side Note:  Environment Variables</a:t>
+            </a:r>
+          </a:p>
+        </p:txBody>
+      </p:sp>
+      <p:sp>
+        <p:nvSpPr>
+          <p:cNvPr id="3" name="Content Placeholder 2">
+            <a:extLst>
+              <a:ext uri="{FF2B5EF4-FFF2-40B4-BE49-F238E27FC236}">
+                <a16:creationId xmlns:a16="http://schemas.microsoft.com/office/drawing/2014/main" id="{5E10BD81-2017-5477-FCFE-493F8DE98352}"/>
+              </a:ext>
+            </a:extLst>
+          </p:cNvPr>
+          <p:cNvSpPr>
+            <a:spLocks noGrp="1"/>
+          </p:cNvSpPr>
+          <p:nvPr>
+            <p:ph idx="1"/>
+          </p:nvPr>
+        </p:nvSpPr>
+        <p:spPr/>
+        <p:txBody>
+          <a:bodyPr/>
+          <a:lstStyle/>
+          <a:p>
+            <a:r>
+              <a:rPr lang="en-US" dirty="0"/>
+              <a:t>Variables maintained at the OS level</a:t>
+            </a:r>
+          </a:p>
+          <a:p>
+            <a:r>
+              <a:rPr lang="en-US" dirty="0"/>
+              <a:t>Typically accessed as strings (but obvi can store numbers or other values as strings)</a:t>
+            </a:r>
+          </a:p>
+          <a:p>
+            <a:r>
+              <a:rPr lang="en-US" dirty="0"/>
+              <a:t>Can be modified and adjusted on the fly</a:t>
+            </a:r>
+          </a:p>
+          <a:p>
+            <a:r>
+              <a:rPr lang="en-US" dirty="0"/>
+              <a:t>PATH is just one of many typical variables</a:t>
+            </a:r>
           </a:p>
         </p:txBody>
       </p:sp>
     </p:spTree>
     <p:extLst>
       <p:ext uri="{BB962C8B-B14F-4D97-AF65-F5344CB8AC3E}">
-        <p14:creationId xmlns:p14="http://schemas.microsoft.com/office/powerpoint/2010/main" val="1738960769"/>
+        <p14:creationId xmlns:p14="http://schemas.microsoft.com/office/powerpoint/2010/main" val="1732645852"/>
       </p:ext>
     </p:extLst>
   </p:cSld>
@@ -5569,4 +6756,319 @@
     </a:ext>
   </a:extLst>
 </a:theme>
+</file>
+
+<file path=ppt/theme/theme2.xml><?xml version="1.0" encoding="utf-8"?>
+<a:theme xmlns:a="http://schemas.openxmlformats.org/drawingml/2006/main" name="Office Theme">
+  <a:themeElements>
+    <a:clrScheme name="Office">
+      <a:dk1>
+        <a:sysClr val="windowText" lastClr="000000"/>
+      </a:dk1>
+      <a:lt1>
+        <a:sysClr val="window" lastClr="FFFFFF"/>
+      </a:lt1>
+      <a:dk2>
+        <a:srgbClr val="0E2841"/>
+      </a:dk2>
+      <a:lt2>
+        <a:srgbClr val="E8E8E8"/>
+      </a:lt2>
+      <a:accent1>
+        <a:srgbClr val="156082"/>
+      </a:accent1>
+      <a:accent2>
+        <a:srgbClr val="E97132"/>
+      </a:accent2>
+      <a:accent3>
+        <a:srgbClr val="196B24"/>
+      </a:accent3>
+      <a:accent4>
+        <a:srgbClr val="0F9ED5"/>
+      </a:accent4>
+      <a:accent5>
+        <a:srgbClr val="A02B93"/>
+      </a:accent5>
+      <a:accent6>
+        <a:srgbClr val="4EA72E"/>
+      </a:accent6>
+      <a:hlink>
+        <a:srgbClr val="467886"/>
+      </a:hlink>
+      <a:folHlink>
+        <a:srgbClr val="96607D"/>
+      </a:folHlink>
+    </a:clrScheme>
+    <a:fontScheme name="Office">
+      <a:majorFont>
+        <a:latin typeface="Aptos Display" panose="02110004020202020204"/>
+        <a:ea typeface=""/>
+        <a:cs typeface=""/>
+        <a:font script="Jpan" typeface="游ゴシック Light"/>
+        <a:font script="Hang" typeface="맑은 고딕"/>
+        <a:font script="Hans" typeface="等线 Light"/>
+        <a:font script="Hant" typeface="新細明體"/>
+        <a:font script="Arab" typeface="Times New Roman"/>
+        <a:font script="Hebr" typeface="Times New Roman"/>
+        <a:font script="Thai" typeface="Angsana New"/>
+        <a:font script="Ethi" typeface="Nyala"/>
+        <a:font script="Beng" typeface="Vrinda"/>
+        <a:font script="Gujr" typeface="Shruti"/>
+        <a:font script="Khmr" typeface="MoolBoran"/>
+        <a:font script="Knda" typeface="Tunga"/>
+        <a:font script="Guru" typeface="Raavi"/>
+        <a:font script="Cans" typeface="Euphemia"/>
+        <a:font script="Cher" typeface="Plantagenet Cherokee"/>
+        <a:font script="Yiii" typeface="Microsoft Yi Baiti"/>
+        <a:font script="Tibt" typeface="Microsoft Himalaya"/>
+        <a:font script="Thaa" typeface="MV Boli"/>
+        <a:font script="Deva" typeface="Mangal"/>
+        <a:font script="Telu" typeface="Gautami"/>
+        <a:font script="Taml" typeface="Latha"/>
+        <a:font script="Syrc" typeface="Estrangelo Edessa"/>
+        <a:font script="Orya" typeface="Kalinga"/>
+        <a:font script="Mlym" typeface="Kartika"/>
+        <a:font script="Laoo" typeface="DokChampa"/>
+        <a:font script="Sinh" typeface="Iskoola Pota"/>
+        <a:font script="Mong" typeface="Mongolian Baiti"/>
+        <a:font script="Viet" typeface="Times New Roman"/>
+        <a:font script="Uigh" typeface="Microsoft Uighur"/>
+        <a:font script="Geor" typeface="Sylfaen"/>
+        <a:font script="Armn" typeface="Arial"/>
+        <a:font script="Bugi" typeface="Leelawadee UI"/>
+        <a:font script="Bopo" typeface="Microsoft JhengHei"/>
+        <a:font script="Java" typeface="Javanese Text"/>
+        <a:font script="Lisu" typeface="Segoe UI"/>
+        <a:font script="Mymr" typeface="Myanmar Text"/>
+        <a:font script="Nkoo" typeface="Ebrima"/>
+        <a:font script="Olck" typeface="Nirmala UI"/>
+        <a:font script="Osma" typeface="Ebrima"/>
+        <a:font script="Phag" typeface="Phagspa"/>
+        <a:font script="Syrn" typeface="Estrangelo Edessa"/>
+        <a:font script="Syrj" typeface="Estrangelo Edessa"/>
+        <a:font script="Syre" typeface="Estrangelo Edessa"/>
+        <a:font script="Sora" typeface="Nirmala UI"/>
+        <a:font script="Tale" typeface="Microsoft Tai Le"/>
+        <a:font script="Talu" typeface="Microsoft New Tai Lue"/>
+        <a:font script="Tfng" typeface="Ebrima"/>
+      </a:majorFont>
+      <a:minorFont>
+        <a:latin typeface="Aptos" panose="02110004020202020204"/>
+        <a:ea typeface=""/>
+        <a:cs typeface=""/>
+        <a:font script="Jpan" typeface="游ゴシック"/>
+        <a:font script="Hang" typeface="맑은 고딕"/>
+        <a:font script="Hans" typeface="等线"/>
+        <a:font script="Hant" typeface="新細明體"/>
+        <a:font script="Arab" typeface="Arial"/>
+        <a:font script="Hebr" typeface="Arial"/>
+        <a:font script="Thai" typeface="Cordia New"/>
+        <a:font script="Ethi" typeface="Nyala"/>
+        <a:font script="Beng" typeface="Vrinda"/>
+        <a:font script="Gujr" typeface="Shruti"/>
+        <a:font script="Khmr" typeface="DaunPenh"/>
+        <a:font script="Knda" typeface="Tunga"/>
+        <a:font script="Guru" typeface="Raavi"/>
+        <a:font script="Cans" typeface="Euphemia"/>
+        <a:font script="Cher" typeface="Plantagenet Cherokee"/>
+        <a:font script="Yiii" typeface="Microsoft Yi Baiti"/>
+        <a:font script="Tibt" typeface="Microsoft Himalaya"/>
+        <a:font script="Thaa" typeface="MV Boli"/>
+        <a:font script="Deva" typeface="Mangal"/>
+        <a:font script="Telu" typeface="Gautami"/>
+        <a:font script="Taml" typeface="Latha"/>
+        <a:font script="Syrc" typeface="Estrangelo Edessa"/>
+        <a:font script="Orya" typeface="Kalinga"/>
+        <a:font script="Mlym" typeface="Kartika"/>
+        <a:font script="Laoo" typeface="DokChampa"/>
+        <a:font script="Sinh" typeface="Iskoola Pota"/>
+        <a:font script="Mong" typeface="Mongolian Baiti"/>
+        <a:font script="Viet" typeface="Arial"/>
+        <a:font script="Uigh" typeface="Microsoft Uighur"/>
+        <a:font script="Geor" typeface="Sylfaen"/>
+        <a:font script="Armn" typeface="Arial"/>
+        <a:font script="Bugi" typeface="Leelawadee UI"/>
+        <a:font script="Bopo" typeface="Microsoft JhengHei"/>
+        <a:font script="Java" typeface="Javanese Text"/>
+        <a:font script="Lisu" typeface="Segoe UI"/>
+        <a:font script="Mymr" typeface="Myanmar Text"/>
+        <a:font script="Nkoo" typeface="Ebrima"/>
+        <a:font script="Olck" typeface="Nirmala UI"/>
+        <a:font script="Osma" typeface="Ebrima"/>
+        <a:font script="Phag" typeface="Phagspa"/>
+        <a:font script="Syrn" typeface="Estrangelo Edessa"/>
+        <a:font script="Syrj" typeface="Estrangelo Edessa"/>
+        <a:font script="Syre" typeface="Estrangelo Edessa"/>
+        <a:font script="Sora" typeface="Nirmala UI"/>
+        <a:font script="Tale" typeface="Microsoft Tai Le"/>
+        <a:font script="Talu" typeface="Microsoft New Tai Lue"/>
+        <a:font script="Tfng" typeface="Ebrima"/>
+      </a:minorFont>
+    </a:fontScheme>
+    <a:fmtScheme name="Office">
+      <a:fillStyleLst>
+        <a:solidFill>
+          <a:schemeClr val="phClr"/>
+        </a:solidFill>
+        <a:gradFill rotWithShape="1">
+          <a:gsLst>
+            <a:gs pos="0">
+              <a:schemeClr val="phClr">
+                <a:lumMod val="110000"/>
+                <a:satMod val="105000"/>
+                <a:tint val="67000"/>
+              </a:schemeClr>
+            </a:gs>
+            <a:gs pos="50000">
+              <a:schemeClr val="phClr">
+                <a:lumMod val="105000"/>
+                <a:satMod val="103000"/>
+                <a:tint val="73000"/>
+              </a:schemeClr>
+            </a:gs>
+            <a:gs pos="100000">
+              <a:schemeClr val="phClr">
+                <a:lumMod val="105000"/>
+                <a:satMod val="109000"/>
+                <a:tint val="81000"/>
+              </a:schemeClr>
+            </a:gs>
+          </a:gsLst>
+          <a:lin ang="5400000" scaled="0"/>
+        </a:gradFill>
+        <a:gradFill rotWithShape="1">
+          <a:gsLst>
+            <a:gs pos="0">
+              <a:schemeClr val="phClr">
+                <a:satMod val="103000"/>
+                <a:lumMod val="102000"/>
+                <a:tint val="94000"/>
+              </a:schemeClr>
+            </a:gs>
+            <a:gs pos="50000">
+              <a:schemeClr val="phClr">
+                <a:satMod val="110000"/>
+                <a:lumMod val="100000"/>
+                <a:shade val="100000"/>
+              </a:schemeClr>
+            </a:gs>
+            <a:gs pos="100000">
+              <a:schemeClr val="phClr">
+                <a:lumMod val="99000"/>
+                <a:satMod val="120000"/>
+                <a:shade val="78000"/>
+              </a:schemeClr>
+            </a:gs>
+          </a:gsLst>
+          <a:lin ang="5400000" scaled="0"/>
+        </a:gradFill>
+      </a:fillStyleLst>
+      <a:lnStyleLst>
+        <a:ln w="12700" cap="flat" cmpd="sng" algn="ctr">
+          <a:solidFill>
+            <a:schemeClr val="phClr"/>
+          </a:solidFill>
+          <a:prstDash val="solid"/>
+          <a:miter lim="800000"/>
+        </a:ln>
+        <a:ln w="19050" cap="flat" cmpd="sng" algn="ctr">
+          <a:solidFill>
+            <a:schemeClr val="phClr"/>
+          </a:solidFill>
+          <a:prstDash val="solid"/>
+          <a:miter lim="800000"/>
+        </a:ln>
+        <a:ln w="25400" cap="flat" cmpd="sng" algn="ctr">
+          <a:solidFill>
+            <a:schemeClr val="phClr"/>
+          </a:solidFill>
+          <a:prstDash val="solid"/>
+          <a:miter lim="800000"/>
+        </a:ln>
+      </a:lnStyleLst>
+      <a:effectStyleLst>
+        <a:effectStyle>
+          <a:effectLst/>
+        </a:effectStyle>
+        <a:effectStyle>
+          <a:effectLst/>
+        </a:effectStyle>
+        <a:effectStyle>
+          <a:effectLst>
+            <a:outerShdw blurRad="57150" dist="19050" dir="5400000" algn="ctr" rotWithShape="0">
+              <a:srgbClr val="000000">
+                <a:alpha val="63000"/>
+              </a:srgbClr>
+            </a:outerShdw>
+          </a:effectLst>
+        </a:effectStyle>
+      </a:effectStyleLst>
+      <a:bgFillStyleLst>
+        <a:solidFill>
+          <a:schemeClr val="phClr"/>
+        </a:solidFill>
+        <a:solidFill>
+          <a:schemeClr val="phClr">
+            <a:tint val="95000"/>
+            <a:satMod val="170000"/>
+          </a:schemeClr>
+        </a:solidFill>
+        <a:gradFill rotWithShape="1">
+          <a:gsLst>
+            <a:gs pos="0">
+              <a:schemeClr val="phClr">
+                <a:tint val="93000"/>
+                <a:satMod val="150000"/>
+                <a:shade val="98000"/>
+                <a:lumMod val="102000"/>
+              </a:schemeClr>
+            </a:gs>
+            <a:gs pos="50000">
+              <a:schemeClr val="phClr">
+                <a:tint val="98000"/>
+                <a:satMod val="130000"/>
+                <a:shade val="90000"/>
+                <a:lumMod val="103000"/>
+              </a:schemeClr>
+            </a:gs>
+            <a:gs pos="100000">
+              <a:schemeClr val="phClr">
+                <a:shade val="63000"/>
+                <a:satMod val="120000"/>
+              </a:schemeClr>
+            </a:gs>
+          </a:gsLst>
+          <a:lin ang="5400000" scaled="0"/>
+        </a:gradFill>
+      </a:bgFillStyleLst>
+    </a:fmtScheme>
+  </a:themeElements>
+  <a:objectDefaults>
+    <a:lnDef>
+      <a:spPr/>
+      <a:bodyPr/>
+      <a:lstStyle/>
+      <a:style>
+        <a:lnRef idx="2">
+          <a:schemeClr val="accent1"/>
+        </a:lnRef>
+        <a:fillRef idx="0">
+          <a:schemeClr val="accent1"/>
+        </a:fillRef>
+        <a:effectRef idx="1">
+          <a:schemeClr val="accent1"/>
+        </a:effectRef>
+        <a:fontRef idx="minor">
+          <a:schemeClr val="tx1"/>
+        </a:fontRef>
+      </a:style>
+    </a:lnDef>
+  </a:objectDefaults>
+  <a:extraClrSchemeLst/>
+  <a:extLst>
+    <a:ext uri="{05A4C25C-085E-4340-85A3-A5531E510DB2}">
+      <thm15:themeFamily xmlns:thm15="http://schemas.microsoft.com/office/thememl/2012/main" name="Office Theme" id="{2E142A2C-CD16-42D6-873A-C26D2A0506FA}" vid="{1BDDFF52-6CD6-40A5-AB3C-68EB2F1E4D0A}"/>
+    </a:ext>
+  </a:extLst>
+</a:theme>
 </file>
</xml_diff>